<commit_message>
chat with Carolyn and Nadine
</commit_message>
<xml_diff>
--- a/PRIME/Kurzstipendium/DAAD_experiments.pptx
+++ b/PRIME/Kurzstipendium/DAAD_experiments.pptx
@@ -204,7 +204,7 @@
           <a:p>
             <a:fld id="{B061A044-314D-4329-9682-F6176F300576}" type="datetimeFigureOut">
               <a:rPr lang="en-US" smtClean="0"/>
-              <a:t>3/2/2025</a:t>
+              <a:t>3/4/2025</a:t>
             </a:fld>
             <a:endParaRPr lang="en-US"/>
           </a:p>
@@ -705,7 +705,7 @@
           <a:p>
             <a:fld id="{7733AE6D-9644-4FC2-AE05-59B9DC610BB8}" type="datetimeFigureOut">
               <a:rPr lang="en-US" smtClean="0"/>
-              <a:t>3/2/2025</a:t>
+              <a:t>3/4/2025</a:t>
             </a:fld>
             <a:endParaRPr lang="en-US"/>
           </a:p>
@@ -905,7 +905,7 @@
           <a:p>
             <a:fld id="{7733AE6D-9644-4FC2-AE05-59B9DC610BB8}" type="datetimeFigureOut">
               <a:rPr lang="en-US" smtClean="0"/>
-              <a:t>3/2/2025</a:t>
+              <a:t>3/4/2025</a:t>
             </a:fld>
             <a:endParaRPr lang="en-US"/>
           </a:p>
@@ -1115,7 +1115,7 @@
           <a:p>
             <a:fld id="{7733AE6D-9644-4FC2-AE05-59B9DC610BB8}" type="datetimeFigureOut">
               <a:rPr lang="en-US" smtClean="0"/>
-              <a:t>3/2/2025</a:t>
+              <a:t>3/4/2025</a:t>
             </a:fld>
             <a:endParaRPr lang="en-US"/>
           </a:p>
@@ -1315,7 +1315,7 @@
           <a:p>
             <a:fld id="{7733AE6D-9644-4FC2-AE05-59B9DC610BB8}" type="datetimeFigureOut">
               <a:rPr lang="en-US" smtClean="0"/>
-              <a:t>3/2/2025</a:t>
+              <a:t>3/4/2025</a:t>
             </a:fld>
             <a:endParaRPr lang="en-US"/>
           </a:p>
@@ -1591,7 +1591,7 @@
           <a:p>
             <a:fld id="{7733AE6D-9644-4FC2-AE05-59B9DC610BB8}" type="datetimeFigureOut">
               <a:rPr lang="en-US" smtClean="0"/>
-              <a:t>3/2/2025</a:t>
+              <a:t>3/4/2025</a:t>
             </a:fld>
             <a:endParaRPr lang="en-US"/>
           </a:p>
@@ -1859,7 +1859,7 @@
           <a:p>
             <a:fld id="{7733AE6D-9644-4FC2-AE05-59B9DC610BB8}" type="datetimeFigureOut">
               <a:rPr lang="en-US" smtClean="0"/>
-              <a:t>3/2/2025</a:t>
+              <a:t>3/4/2025</a:t>
             </a:fld>
             <a:endParaRPr lang="en-US"/>
           </a:p>
@@ -2274,7 +2274,7 @@
           <a:p>
             <a:fld id="{7733AE6D-9644-4FC2-AE05-59B9DC610BB8}" type="datetimeFigureOut">
               <a:rPr lang="en-US" smtClean="0"/>
-              <a:t>3/2/2025</a:t>
+              <a:t>3/4/2025</a:t>
             </a:fld>
             <a:endParaRPr lang="en-US"/>
           </a:p>
@@ -2416,7 +2416,7 @@
           <a:p>
             <a:fld id="{7733AE6D-9644-4FC2-AE05-59B9DC610BB8}" type="datetimeFigureOut">
               <a:rPr lang="en-US" smtClean="0"/>
-              <a:t>3/2/2025</a:t>
+              <a:t>3/4/2025</a:t>
             </a:fld>
             <a:endParaRPr lang="en-US"/>
           </a:p>
@@ -2529,7 +2529,7 @@
           <a:p>
             <a:fld id="{7733AE6D-9644-4FC2-AE05-59B9DC610BB8}" type="datetimeFigureOut">
               <a:rPr lang="en-US" smtClean="0"/>
-              <a:t>3/2/2025</a:t>
+              <a:t>3/4/2025</a:t>
             </a:fld>
             <a:endParaRPr lang="en-US"/>
           </a:p>
@@ -2842,7 +2842,7 @@
           <a:p>
             <a:fld id="{7733AE6D-9644-4FC2-AE05-59B9DC610BB8}" type="datetimeFigureOut">
               <a:rPr lang="en-US" smtClean="0"/>
-              <a:t>3/2/2025</a:t>
+              <a:t>3/4/2025</a:t>
             </a:fld>
             <a:endParaRPr lang="en-US"/>
           </a:p>
@@ -3131,7 +3131,7 @@
           <a:p>
             <a:fld id="{7733AE6D-9644-4FC2-AE05-59B9DC610BB8}" type="datetimeFigureOut">
               <a:rPr lang="en-US" smtClean="0"/>
-              <a:t>3/2/2025</a:t>
+              <a:t>3/4/2025</a:t>
             </a:fld>
             <a:endParaRPr lang="en-US"/>
           </a:p>
@@ -3374,7 +3374,7 @@
           <a:p>
             <a:fld id="{7733AE6D-9644-4FC2-AE05-59B9DC610BB8}" type="datetimeFigureOut">
               <a:rPr lang="en-US" smtClean="0"/>
-              <a:t>3/2/2025</a:t>
+              <a:t>3/4/2025</a:t>
             </a:fld>
             <a:endParaRPr lang="en-US"/>
           </a:p>

</xml_diff>

<commit_message>
prepared documents for DAAD
</commit_message>
<xml_diff>
--- a/PRIME/Kurzstipendium/DAAD_experiments.pptx
+++ b/PRIME/Kurzstipendium/DAAD_experiments.pptx
@@ -204,7 +204,7 @@
           <a:p>
             <a:fld id="{B061A044-314D-4329-9682-F6176F300576}" type="datetimeFigureOut">
               <a:rPr lang="en-US" smtClean="0"/>
-              <a:t>3/4/2025</a:t>
+              <a:t>3/7/2025</a:t>
             </a:fld>
             <a:endParaRPr lang="en-US"/>
           </a:p>
@@ -705,7 +705,7 @@
           <a:p>
             <a:fld id="{7733AE6D-9644-4FC2-AE05-59B9DC610BB8}" type="datetimeFigureOut">
               <a:rPr lang="en-US" smtClean="0"/>
-              <a:t>3/4/2025</a:t>
+              <a:t>3/7/2025</a:t>
             </a:fld>
             <a:endParaRPr lang="en-US"/>
           </a:p>
@@ -905,7 +905,7 @@
           <a:p>
             <a:fld id="{7733AE6D-9644-4FC2-AE05-59B9DC610BB8}" type="datetimeFigureOut">
               <a:rPr lang="en-US" smtClean="0"/>
-              <a:t>3/4/2025</a:t>
+              <a:t>3/7/2025</a:t>
             </a:fld>
             <a:endParaRPr lang="en-US"/>
           </a:p>
@@ -1115,7 +1115,7 @@
           <a:p>
             <a:fld id="{7733AE6D-9644-4FC2-AE05-59B9DC610BB8}" type="datetimeFigureOut">
               <a:rPr lang="en-US" smtClean="0"/>
-              <a:t>3/4/2025</a:t>
+              <a:t>3/7/2025</a:t>
             </a:fld>
             <a:endParaRPr lang="en-US"/>
           </a:p>
@@ -1315,7 +1315,7 @@
           <a:p>
             <a:fld id="{7733AE6D-9644-4FC2-AE05-59B9DC610BB8}" type="datetimeFigureOut">
               <a:rPr lang="en-US" smtClean="0"/>
-              <a:t>3/4/2025</a:t>
+              <a:t>3/7/2025</a:t>
             </a:fld>
             <a:endParaRPr lang="en-US"/>
           </a:p>
@@ -1591,7 +1591,7 @@
           <a:p>
             <a:fld id="{7733AE6D-9644-4FC2-AE05-59B9DC610BB8}" type="datetimeFigureOut">
               <a:rPr lang="en-US" smtClean="0"/>
-              <a:t>3/4/2025</a:t>
+              <a:t>3/7/2025</a:t>
             </a:fld>
             <a:endParaRPr lang="en-US"/>
           </a:p>
@@ -1859,7 +1859,7 @@
           <a:p>
             <a:fld id="{7733AE6D-9644-4FC2-AE05-59B9DC610BB8}" type="datetimeFigureOut">
               <a:rPr lang="en-US" smtClean="0"/>
-              <a:t>3/4/2025</a:t>
+              <a:t>3/7/2025</a:t>
             </a:fld>
             <a:endParaRPr lang="en-US"/>
           </a:p>
@@ -2274,7 +2274,7 @@
           <a:p>
             <a:fld id="{7733AE6D-9644-4FC2-AE05-59B9DC610BB8}" type="datetimeFigureOut">
               <a:rPr lang="en-US" smtClean="0"/>
-              <a:t>3/4/2025</a:t>
+              <a:t>3/7/2025</a:t>
             </a:fld>
             <a:endParaRPr lang="en-US"/>
           </a:p>
@@ -2416,7 +2416,7 @@
           <a:p>
             <a:fld id="{7733AE6D-9644-4FC2-AE05-59B9DC610BB8}" type="datetimeFigureOut">
               <a:rPr lang="en-US" smtClean="0"/>
-              <a:t>3/4/2025</a:t>
+              <a:t>3/7/2025</a:t>
             </a:fld>
             <a:endParaRPr lang="en-US"/>
           </a:p>
@@ -2529,7 +2529,7 @@
           <a:p>
             <a:fld id="{7733AE6D-9644-4FC2-AE05-59B9DC610BB8}" type="datetimeFigureOut">
               <a:rPr lang="en-US" smtClean="0"/>
-              <a:t>3/4/2025</a:t>
+              <a:t>3/7/2025</a:t>
             </a:fld>
             <a:endParaRPr lang="en-US"/>
           </a:p>
@@ -2842,7 +2842,7 @@
           <a:p>
             <a:fld id="{7733AE6D-9644-4FC2-AE05-59B9DC610BB8}" type="datetimeFigureOut">
               <a:rPr lang="en-US" smtClean="0"/>
-              <a:t>3/4/2025</a:t>
+              <a:t>3/7/2025</a:t>
             </a:fld>
             <a:endParaRPr lang="en-US"/>
           </a:p>
@@ -3131,7 +3131,7 @@
           <a:p>
             <a:fld id="{7733AE6D-9644-4FC2-AE05-59B9DC610BB8}" type="datetimeFigureOut">
               <a:rPr lang="en-US" smtClean="0"/>
-              <a:t>3/4/2025</a:t>
+              <a:t>3/7/2025</a:t>
             </a:fld>
             <a:endParaRPr lang="en-US"/>
           </a:p>
@@ -3374,7 +3374,7 @@
           <a:p>
             <a:fld id="{7733AE6D-9644-4FC2-AE05-59B9DC610BB8}" type="datetimeFigureOut">
               <a:rPr lang="en-US" smtClean="0"/>
-              <a:t>3/4/2025</a:t>
+              <a:t>3/7/2025</a:t>
             </a:fld>
             <a:endParaRPr lang="en-US"/>
           </a:p>
@@ -8339,7 +8339,7 @@
           <p:nvPr>
             <p:extLst>
               <p:ext uri="{D42A27DB-BD31-4B8C-83A1-F6EECF244321}">
-                <p14:modId xmlns:p14="http://schemas.microsoft.com/office/powerpoint/2010/main" val="909272278"/>
+                <p14:modId xmlns:p14="http://schemas.microsoft.com/office/powerpoint/2010/main" val="914952650"/>
               </p:ext>
             </p:extLst>
           </p:nvPr>
@@ -8469,22 +8469,6 @@
                       <a:r>
                         <a:rPr lang="de-DE" sz="1200" dirty="0" err="1"/>
                         <a:t>set-up</a:t>
-                      </a:r>
-                      <a:r>
-                        <a:rPr lang="de-DE" sz="1200" dirty="0"/>
-                        <a:t>, </a:t>
-                      </a:r>
-                      <a:r>
-                        <a:rPr lang="de-DE" sz="1200" dirty="0" err="1"/>
-                        <a:t>ethical</a:t>
-                      </a:r>
-                      <a:r>
-                        <a:rPr lang="de-DE" sz="1200" dirty="0"/>
-                        <a:t> </a:t>
-                      </a:r>
-                      <a:r>
-                        <a:rPr lang="de-DE" sz="1200" dirty="0" err="1"/>
-                        <a:t>approval</a:t>
                       </a:r>
                       <a:r>
                         <a:rPr lang="de-DE" sz="1200" dirty="0"/>
@@ -8662,22 +8646,6 @@
                         <a:tabLst/>
                         <a:defRPr/>
                       </a:pPr>
-                      <a:r>
-                        <a:rPr lang="de-DE" sz="1200" dirty="0" err="1"/>
-                        <a:t>ethical</a:t>
-                      </a:r>
-                      <a:r>
-                        <a:rPr lang="de-DE" sz="1200" dirty="0"/>
-                        <a:t> </a:t>
-                      </a:r>
-                      <a:r>
-                        <a:rPr lang="de-DE" sz="1200" dirty="0" err="1"/>
-                        <a:t>approval</a:t>
-                      </a:r>
-                      <a:r>
-                        <a:rPr lang="de-DE" sz="1200" dirty="0"/>
-                        <a:t>, </a:t>
-                      </a:r>
                       <a:r>
                         <a:rPr lang="de-DE" sz="1200" dirty="0" err="1"/>
                         <a:t>preparation</a:t>

</xml_diff>